<commit_message>
Fix some minor mistakes in the Documentation.
But it seems that some internal links do not work.
</commit_message>
<xml_diff>
--- a/Documentation/images.pptx
+++ b/Documentation/images.pptx
@@ -6229,7 +6229,11 @@
             <a:prstGeom prst="line">
               <a:avLst/>
             </a:prstGeom>
-            <a:ln w="28575"/>
+            <a:ln w="28575">
+              <a:solidFill>
+                <a:srgbClr val="C00000"/>
+              </a:solidFill>
+            </a:ln>
           </p:spPr>
           <p:style>
             <a:lnRef idx="1">

</xml_diff>